<commit_message>
Uploaded complete pptx presentation
</commit_message>
<xml_diff>
--- a/DesignDocument/Presentation/presentation.pptx
+++ b/DesignDocument/Presentation/presentation.pptx
@@ -108,6 +108,11 @@
       </a:defRPr>
     </a:lvl9pPr>
   </p:defaultTextStyle>
+  <p:extLst>
+    <p:ext uri="{EFAFB233-063F-42B5-8137-9DF3F51BA10A}">
+      <p15:sldGuideLst xmlns:p15="http://schemas.microsoft.com/office/powerpoint/2012/main"/>
+    </p:ext>
+  </p:extLst>
 </p:presentation>
 </file>
 
@@ -156,7 +161,6 @@
               <a:rPr lang="it-IT"/>
               <a:t>Fare clic per modificare lo stile del titolo</a:t>
             </a:r>
-            <a:endParaRPr lang="it-IT"/>
           </a:p>
         </p:txBody>
       </p:sp>
@@ -221,7 +225,6 @@
               <a:rPr lang="it-IT"/>
               <a:t>Fare clic per modificare lo stile del sottotitolo dello schema</a:t>
             </a:r>
-            <a:endParaRPr lang="it-IT"/>
           </a:p>
         </p:txBody>
       </p:sp>
@@ -339,7 +342,6 @@
               <a:rPr lang="it-IT"/>
               <a:t>Fare clic per modificare lo stile del titolo</a:t>
             </a:r>
-            <a:endParaRPr lang="it-IT"/>
           </a:p>
         </p:txBody>
       </p:sp>
@@ -391,7 +393,6 @@
               <a:rPr lang="it-IT"/>
               <a:t>Quinto livello</a:t>
             </a:r>
-            <a:endParaRPr lang="it-IT"/>
           </a:p>
         </p:txBody>
       </p:sp>
@@ -514,7 +515,6 @@
               <a:rPr lang="it-IT"/>
               <a:t>Fare clic per modificare lo stile del titolo</a:t>
             </a:r>
-            <a:endParaRPr lang="it-IT"/>
           </a:p>
         </p:txBody>
       </p:sp>
@@ -571,7 +571,6 @@
               <a:rPr lang="it-IT"/>
               <a:t>Quinto livello</a:t>
             </a:r>
-            <a:endParaRPr lang="it-IT"/>
           </a:p>
         </p:txBody>
       </p:sp>
@@ -689,7 +688,6 @@
               <a:rPr lang="it-IT"/>
               <a:t>Fare clic per modificare lo stile del titolo</a:t>
             </a:r>
-            <a:endParaRPr lang="it-IT"/>
           </a:p>
         </p:txBody>
       </p:sp>
@@ -741,7 +739,6 @@
               <a:rPr lang="it-IT"/>
               <a:t>Quinto livello</a:t>
             </a:r>
-            <a:endParaRPr lang="it-IT"/>
           </a:p>
         </p:txBody>
       </p:sp>
@@ -868,7 +865,6 @@
               <a:rPr lang="it-IT"/>
               <a:t>Fare clic per modificare lo stile del titolo</a:t>
             </a:r>
-            <a:endParaRPr lang="it-IT"/>
           </a:p>
         </p:txBody>
       </p:sp>
@@ -1105,7 +1101,6 @@
               <a:rPr lang="it-IT"/>
               <a:t>Fare clic per modificare lo stile del titolo</a:t>
             </a:r>
-            <a:endParaRPr lang="it-IT"/>
           </a:p>
         </p:txBody>
       </p:sp>
@@ -1162,7 +1157,6 @@
               <a:rPr lang="it-IT"/>
               <a:t>Quinto livello</a:t>
             </a:r>
-            <a:endParaRPr lang="it-IT"/>
           </a:p>
         </p:txBody>
       </p:sp>
@@ -1219,7 +1213,6 @@
               <a:rPr lang="it-IT"/>
               <a:t>Quinto livello</a:t>
             </a:r>
-            <a:endParaRPr lang="it-IT"/>
           </a:p>
         </p:txBody>
       </p:sp>
@@ -1342,7 +1335,6 @@
               <a:rPr lang="it-IT"/>
               <a:t>Fare clic per modificare lo stile del titolo</a:t>
             </a:r>
-            <a:endParaRPr lang="it-IT"/>
           </a:p>
         </p:txBody>
       </p:sp>
@@ -1464,7 +1456,6 @@
               <a:rPr lang="it-IT"/>
               <a:t>Quinto livello</a:t>
             </a:r>
-            <a:endParaRPr lang="it-IT"/>
           </a:p>
         </p:txBody>
       </p:sp>
@@ -1586,7 +1577,6 @@
               <a:rPr lang="it-IT"/>
               <a:t>Quinto livello</a:t>
             </a:r>
-            <a:endParaRPr lang="it-IT"/>
           </a:p>
         </p:txBody>
       </p:sp>
@@ -1704,7 +1694,6 @@
               <a:rPr lang="it-IT"/>
               <a:t>Fare clic per modificare lo stile del titolo</a:t>
             </a:r>
-            <a:endParaRPr lang="it-IT"/>
           </a:p>
         </p:txBody>
       </p:sp>
@@ -1926,7 +1915,6 @@
               <a:rPr lang="it-IT"/>
               <a:t>Fare clic per modificare lo stile del titolo</a:t>
             </a:r>
-            <a:endParaRPr lang="it-IT"/>
           </a:p>
         </p:txBody>
       </p:sp>
@@ -2011,7 +1999,6 @@
               <a:rPr lang="it-IT"/>
               <a:t>Quinto livello</a:t>
             </a:r>
-            <a:endParaRPr lang="it-IT"/>
           </a:p>
         </p:txBody>
       </p:sp>
@@ -2203,7 +2190,6 @@
               <a:rPr lang="it-IT"/>
               <a:t>Fare clic per modificare lo stile del titolo</a:t>
             </a:r>
-            <a:endParaRPr lang="it-IT"/>
           </a:p>
         </p:txBody>
       </p:sp>
@@ -2467,7 +2453,6 @@
               <a:rPr lang="it-IT"/>
               <a:t>Fare clic per modificare lo stile del titolo</a:t>
             </a:r>
-            <a:endParaRPr lang="it-IT"/>
           </a:p>
         </p:txBody>
       </p:sp>
@@ -2529,7 +2514,6 @@
               <a:rPr lang="it-IT"/>
               <a:t>Quinto livello</a:t>
             </a:r>
-            <a:endParaRPr lang="it-IT"/>
           </a:p>
         </p:txBody>
       </p:sp>
@@ -3260,13 +3244,8 @@
             </a:pPr>
             <a:r>
               <a:rPr lang="it-IT" dirty="0"/>
-              <a:t>Account </a:t>
-            </a:r>
-            <a:r>
-              <a:rPr lang="it-IT" dirty="0" err="1"/>
-              <a:t>Managment</a:t>
-            </a:r>
-            <a:endParaRPr lang="it-IT" dirty="0"/>
+              <a:t>Account Management</a:t>
+            </a:r>
           </a:p>
           <a:p>
             <a:pPr>
@@ -3279,13 +3258,8 @@
             </a:r>
             <a:r>
               <a:rPr lang="it-IT" dirty="0"/>
-              <a:t> </a:t>
-            </a:r>
-            <a:r>
-              <a:rPr lang="it-IT" dirty="0" err="1"/>
-              <a:t>Managment</a:t>
-            </a:r>
-            <a:endParaRPr lang="it-IT" dirty="0"/>
+              <a:t> Management</a:t>
+            </a:r>
           </a:p>
           <a:p>
             <a:pPr>
@@ -3298,13 +3272,8 @@
             </a:r>
             <a:r>
               <a:rPr lang="it-IT" dirty="0"/>
-              <a:t> </a:t>
-            </a:r>
-            <a:r>
-              <a:rPr lang="it-IT" dirty="0" err="1"/>
-              <a:t>Managment</a:t>
-            </a:r>
-            <a:endParaRPr lang="it-IT" dirty="0"/>
+              <a:t> Management</a:t>
+            </a:r>
           </a:p>
           <a:p>
             <a:pPr>

</xml_diff>